<commit_message>
Update session 40 documents.
</commit_message>
<xml_diff>
--- a/CPSC-24700/Presentations/cloud-computing-mapreduce.pptx
+++ b/CPSC-24700/Presentations/cloud-computing-mapreduce.pptx
@@ -265,7 +265,7 @@
           <a:p>
             <a:fld id="{867DF453-BE2D-4869-BB70-2E04BD2A7F29}" type="datetimeFigureOut">
               <a:rPr lang="en-US" smtClean="0"/>
-              <a:t>12/5/2017</a:t>
+              <a:t>12/6/2017</a:t>
             </a:fld>
             <a:endParaRPr lang="en-US"/>
           </a:p>
@@ -979,6 +979,93 @@
       </p:grpSpPr>
       <p:sp>
         <p:nvSpPr>
+          <p:cNvPr id="2" name="Slide Image Placeholder 1"/>
+          <p:cNvSpPr>
+            <a:spLocks noGrp="1" noRot="1" noChangeAspect="1"/>
+          </p:cNvSpPr>
+          <p:nvPr>
+            <p:ph type="sldImg"/>
+          </p:nvPr>
+        </p:nvSpPr>
+        <p:spPr/>
+      </p:sp>
+      <p:sp>
+        <p:nvSpPr>
+          <p:cNvPr id="3" name="Notes Placeholder 2"/>
+          <p:cNvSpPr>
+            <a:spLocks noGrp="1"/>
+          </p:cNvSpPr>
+          <p:nvPr>
+            <p:ph type="body" idx="1"/>
+          </p:nvPr>
+        </p:nvSpPr>
+        <p:spPr/>
+        <p:txBody>
+          <a:bodyPr/>
+          <a:lstStyle/>
+          <a:p>
+            <a:r>
+              <a:rPr lang="en-US" dirty="0"/>
+              <a:t>Hint: Review slides 32 and 33 in detail.</a:t>
+            </a:r>
+          </a:p>
+        </p:txBody>
+      </p:sp>
+      <p:sp>
+        <p:nvSpPr>
+          <p:cNvPr id="4" name="Slide Number Placeholder 3"/>
+          <p:cNvSpPr>
+            <a:spLocks noGrp="1"/>
+          </p:cNvSpPr>
+          <p:nvPr>
+            <p:ph type="sldNum" sz="quarter" idx="10"/>
+          </p:nvPr>
+        </p:nvSpPr>
+        <p:spPr/>
+        <p:txBody>
+          <a:bodyPr/>
+          <a:lstStyle/>
+          <a:p>
+            <a:fld id="{2B076E54-8626-4DCD-A6CB-66B8D321D950}" type="slidenum">
+              <a:rPr lang="en-US" smtClean="0"/>
+              <a:t>32</a:t>
+            </a:fld>
+            <a:endParaRPr lang="en-US"/>
+          </a:p>
+        </p:txBody>
+      </p:sp>
+    </p:spTree>
+    <p:extLst>
+      <p:ext uri="{BB962C8B-B14F-4D97-AF65-F5344CB8AC3E}">
+        <p14:creationId xmlns:p14="http://schemas.microsoft.com/office/powerpoint/2010/main" val="3109906704"/>
+      </p:ext>
+    </p:extLst>
+  </p:cSld>
+  <p:clrMapOvr>
+    <a:masterClrMapping/>
+  </p:clrMapOvr>
+</p:notes>
+</file>
+
+<file path=ppt/notesSlides/notesSlide5.xml><?xml version="1.0" encoding="utf-8"?>
+<p:notes xmlns:a="http://schemas.openxmlformats.org/drawingml/2006/main" xmlns:r="http://schemas.openxmlformats.org/officeDocument/2006/relationships" xmlns:p="http://schemas.openxmlformats.org/presentationml/2006/main">
+  <p:cSld>
+    <p:spTree>
+      <p:nvGrpSpPr>
+        <p:cNvPr id="1" name=""/>
+        <p:cNvGrpSpPr/>
+        <p:nvPr/>
+      </p:nvGrpSpPr>
+      <p:grpSpPr>
+        <a:xfrm>
+          <a:off x="0" y="0"/>
+          <a:ext cx="0" cy="0"/>
+          <a:chOff x="0" y="0"/>
+          <a:chExt cx="0" cy="0"/>
+        </a:xfrm>
+      </p:grpSpPr>
+      <p:sp>
+        <p:nvSpPr>
           <p:cNvPr id="110594" name="Slide Image Placeholder 1"/>
           <p:cNvSpPr>
             <a:spLocks noGrp="1" noRot="1" noChangeAspect="1" noTextEdit="1"/>
@@ -1201,7 +1288,7 @@
 </p:notes>
 </file>
 
-<file path=ppt/notesSlides/notesSlide5.xml><?xml version="1.0" encoding="utf-8"?>
+<file path=ppt/notesSlides/notesSlide6.xml><?xml version="1.0" encoding="utf-8"?>
 <p:notes xmlns:a="http://schemas.openxmlformats.org/drawingml/2006/main" xmlns:r="http://schemas.openxmlformats.org/officeDocument/2006/relationships" xmlns:p="http://schemas.openxmlformats.org/presentationml/2006/main">
   <p:cSld>
     <p:spTree>
@@ -1502,7 +1589,7 @@
             <a:fld id="{1D8BD707-D9CF-40AE-B4C6-C98DA3205C09}" type="datetimeFigureOut">
               <a:rPr lang="en-US" smtClean="0"/>
               <a:pPr/>
-              <a:t>12/5/2017</a:t>
+              <a:t>12/6/2017</a:t>
             </a:fld>
             <a:endParaRPr lang="en-US"/>
           </a:p>
@@ -1771,7 +1858,7 @@
             <a:fld id="{1D8BD707-D9CF-40AE-B4C6-C98DA3205C09}" type="datetimeFigureOut">
               <a:rPr lang="en-US" smtClean="0"/>
               <a:pPr/>
-              <a:t>12/5/2017</a:t>
+              <a:t>12/6/2017</a:t>
             </a:fld>
             <a:endParaRPr lang="en-US"/>
           </a:p>
@@ -1953,7 +2040,7 @@
             <a:fld id="{1D8BD707-D9CF-40AE-B4C6-C98DA3205C09}" type="datetimeFigureOut">
               <a:rPr lang="en-US" smtClean="0"/>
               <a:pPr/>
-              <a:t>12/5/2017</a:t>
+              <a:t>12/6/2017</a:t>
             </a:fld>
             <a:endParaRPr lang="en-US"/>
           </a:p>
@@ -2145,7 +2232,7 @@
             <a:fld id="{1D8BD707-D9CF-40AE-B4C6-C98DA3205C09}" type="datetimeFigureOut">
               <a:rPr lang="en-US" smtClean="0"/>
               <a:pPr/>
-              <a:t>12/5/2017</a:t>
+              <a:t>12/6/2017</a:t>
             </a:fld>
             <a:endParaRPr lang="en-US"/>
           </a:p>
@@ -2323,7 +2410,7 @@
             <a:fld id="{A6BD6E06-0F29-43E3-9201-8686C612D655}" type="datetime1">
               <a:rPr lang="en-US" smtClean="0"/>
               <a:pPr/>
-              <a:t>12/5/2017</a:t>
+              <a:t>12/6/2017</a:t>
             </a:fld>
             <a:endParaRPr lang="en-US"/>
           </a:p>
@@ -2532,7 +2619,7 @@
           <a:p>
             <a:fld id="{5FB62F81-FD80-4AA8-93CA-E835B40BE667}" type="datetimeFigureOut">
               <a:rPr lang="en-US" smtClean="0"/>
-              <a:t>12/5/2017</a:t>
+              <a:t>12/6/2017</a:t>
             </a:fld>
             <a:endParaRPr lang="en-US"/>
           </a:p>
@@ -2730,7 +2817,7 @@
           <a:p>
             <a:fld id="{5FB62F81-FD80-4AA8-93CA-E835B40BE667}" type="datetimeFigureOut">
               <a:rPr lang="en-US" smtClean="0"/>
-              <a:t>12/5/2017</a:t>
+              <a:t>12/6/2017</a:t>
             </a:fld>
             <a:endParaRPr lang="en-US"/>
           </a:p>
@@ -3005,7 +3092,7 @@
           <a:p>
             <a:fld id="{5FB62F81-FD80-4AA8-93CA-E835B40BE667}" type="datetimeFigureOut">
               <a:rPr lang="en-US" smtClean="0"/>
-              <a:t>12/5/2017</a:t>
+              <a:t>12/6/2017</a:t>
             </a:fld>
             <a:endParaRPr lang="en-US"/>
           </a:p>
@@ -3270,7 +3357,7 @@
           <a:p>
             <a:fld id="{5FB62F81-FD80-4AA8-93CA-E835B40BE667}" type="datetimeFigureOut">
               <a:rPr lang="en-US" smtClean="0"/>
-              <a:t>12/5/2017</a:t>
+              <a:t>12/6/2017</a:t>
             </a:fld>
             <a:endParaRPr lang="en-US"/>
           </a:p>
@@ -3682,7 +3769,7 @@
           <a:p>
             <a:fld id="{5FB62F81-FD80-4AA8-93CA-E835B40BE667}" type="datetimeFigureOut">
               <a:rPr lang="en-US" smtClean="0"/>
-              <a:t>12/5/2017</a:t>
+              <a:t>12/6/2017</a:t>
             </a:fld>
             <a:endParaRPr lang="en-US"/>
           </a:p>
@@ -3823,7 +3910,7 @@
           <a:p>
             <a:fld id="{5FB62F81-FD80-4AA8-93CA-E835B40BE667}" type="datetimeFigureOut">
               <a:rPr lang="en-US" smtClean="0"/>
-              <a:t>12/5/2017</a:t>
+              <a:t>12/6/2017</a:t>
             </a:fld>
             <a:endParaRPr lang="en-US"/>
           </a:p>
@@ -3971,7 +4058,7 @@
             <a:fld id="{1D8BD707-D9CF-40AE-B4C6-C98DA3205C09}" type="datetimeFigureOut">
               <a:rPr lang="en-US" smtClean="0"/>
               <a:pPr/>
-              <a:t>12/5/2017</a:t>
+              <a:t>12/6/2017</a:t>
             </a:fld>
             <a:endParaRPr lang="en-US"/>
           </a:p>
@@ -4081,7 +4168,7 @@
           <a:p>
             <a:fld id="{5FB62F81-FD80-4AA8-93CA-E835B40BE667}" type="datetimeFigureOut">
               <a:rPr lang="en-US" smtClean="0"/>
-              <a:t>12/5/2017</a:t>
+              <a:t>12/6/2017</a:t>
             </a:fld>
             <a:endParaRPr lang="en-US"/>
           </a:p>
@@ -4392,7 +4479,7 @@
           <a:p>
             <a:fld id="{5FB62F81-FD80-4AA8-93CA-E835B40BE667}" type="datetimeFigureOut">
               <a:rPr lang="en-US" smtClean="0"/>
-              <a:t>12/5/2017</a:t>
+              <a:t>12/6/2017</a:t>
             </a:fld>
             <a:endParaRPr lang="en-US"/>
           </a:p>
@@ -4680,7 +4767,7 @@
           <a:p>
             <a:fld id="{5FB62F81-FD80-4AA8-93CA-E835B40BE667}" type="datetimeFigureOut">
               <a:rPr lang="en-US" smtClean="0"/>
-              <a:t>12/5/2017</a:t>
+              <a:t>12/6/2017</a:t>
             </a:fld>
             <a:endParaRPr lang="en-US"/>
           </a:p>
@@ -4878,7 +4965,7 @@
           <a:p>
             <a:fld id="{5FB62F81-FD80-4AA8-93CA-E835B40BE667}" type="datetimeFigureOut">
               <a:rPr lang="en-US" smtClean="0"/>
-              <a:t>12/5/2017</a:t>
+              <a:t>12/6/2017</a:t>
             </a:fld>
             <a:endParaRPr lang="en-US"/>
           </a:p>
@@ -5086,7 +5173,7 @@
           <a:p>
             <a:fld id="{5FB62F81-FD80-4AA8-93CA-E835B40BE667}" type="datetimeFigureOut">
               <a:rPr lang="en-US" smtClean="0"/>
-              <a:t>12/5/2017</a:t>
+              <a:t>12/6/2017</a:t>
             </a:fld>
             <a:endParaRPr lang="en-US"/>
           </a:p>
@@ -5328,7 +5415,7 @@
             <a:fld id="{1D8BD707-D9CF-40AE-B4C6-C98DA3205C09}" type="datetimeFigureOut">
               <a:rPr lang="en-US" smtClean="0"/>
               <a:pPr/>
-              <a:t>12/5/2017</a:t>
+              <a:t>12/6/2017</a:t>
             </a:fld>
             <a:endParaRPr lang="en-US"/>
           </a:p>
@@ -5533,7 +5620,7 @@
             <a:fld id="{1D8BD707-D9CF-40AE-B4C6-C98DA3205C09}" type="datetimeFigureOut">
               <a:rPr lang="en-US" smtClean="0"/>
               <a:pPr/>
-              <a:t>12/5/2017</a:t>
+              <a:t>12/6/2017</a:t>
             </a:fld>
             <a:endParaRPr lang="en-US"/>
           </a:p>
@@ -5832,7 +5919,7 @@
             <a:fld id="{1D8BD707-D9CF-40AE-B4C6-C98DA3205C09}" type="datetimeFigureOut">
               <a:rPr lang="en-US" smtClean="0"/>
               <a:pPr/>
-              <a:t>12/5/2017</a:t>
+              <a:t>12/6/2017</a:t>
             </a:fld>
             <a:endParaRPr lang="en-US"/>
           </a:p>
@@ -6270,7 +6357,7 @@
             <a:fld id="{1D8BD707-D9CF-40AE-B4C6-C98DA3205C09}" type="datetimeFigureOut">
               <a:rPr lang="en-US" smtClean="0"/>
               <a:pPr/>
-              <a:t>12/5/2017</a:t>
+              <a:t>12/6/2017</a:t>
             </a:fld>
             <a:endParaRPr lang="en-US"/>
           </a:p>
@@ -6401,7 +6488,7 @@
             <a:fld id="{1D8BD707-D9CF-40AE-B4C6-C98DA3205C09}" type="datetimeFigureOut">
               <a:rPr lang="en-US" smtClean="0"/>
               <a:pPr/>
-              <a:t>12/5/2017</a:t>
+              <a:t>12/6/2017</a:t>
             </a:fld>
             <a:endParaRPr lang="en-US"/>
           </a:p>
@@ -6510,7 +6597,7 @@
             <a:fld id="{1D8BD707-D9CF-40AE-B4C6-C98DA3205C09}" type="datetimeFigureOut">
               <a:rPr lang="en-US" smtClean="0"/>
               <a:pPr/>
-              <a:t>12/5/2017</a:t>
+              <a:t>12/6/2017</a:t>
             </a:fld>
             <a:endParaRPr lang="en-US"/>
           </a:p>
@@ -6799,7 +6886,7 @@
             <a:fld id="{1D8BD707-D9CF-40AE-B4C6-C98DA3205C09}" type="datetimeFigureOut">
               <a:rPr lang="en-US" smtClean="0"/>
               <a:pPr/>
-              <a:t>12/5/2017</a:t>
+              <a:t>12/6/2017</a:t>
             </a:fld>
             <a:endParaRPr lang="en-US"/>
           </a:p>
@@ -7126,7 +7213,7 @@
             <a:fld id="{1D8BD707-D9CF-40AE-B4C6-C98DA3205C09}" type="datetimeFigureOut">
               <a:rPr lang="en-US" smtClean="0"/>
               <a:pPr/>
-              <a:t>12/5/2017</a:t>
+              <a:t>12/6/2017</a:t>
             </a:fld>
             <a:endParaRPr lang="en-US"/>
           </a:p>
@@ -7828,7 +7915,7 @@
           <a:p>
             <a:fld id="{5FB62F81-FD80-4AA8-93CA-E835B40BE667}" type="datetimeFigureOut">
               <a:rPr lang="en-US" smtClean="0"/>
-              <a:t>12/5/2017</a:t>
+              <a:t>12/6/2017</a:t>
             </a:fld>
             <a:endParaRPr lang="en-US"/>
           </a:p>

</xml_diff>